<commit_message>
cleaned up 'h' vs 'ell' and worked on image 3
</commit_message>
<xml_diff>
--- a/ICRA19/pictures/pdf/KilobotAngleThreeAngles.pptx
+++ b/ICRA19/pictures/pdf/KilobotAngleThreeAngles.pptx
@@ -302,7 +302,7 @@
           <a:p>
             <a:fld id="{D3263C19-BABB-6B4C-BCF7-22CEE07C7D3B}" type="datetimeFigureOut">
               <a:rPr lang="en-US" smtClean="0"/>
-              <a:t>9/10/18</a:t>
+              <a:t>9/13/18</a:t>
             </a:fld>
             <a:endParaRPr lang="en-US"/>
           </a:p>
@@ -470,7 +470,7 @@
           <a:p>
             <a:fld id="{D3263C19-BABB-6B4C-BCF7-22CEE07C7D3B}" type="datetimeFigureOut">
               <a:rPr lang="en-US" smtClean="0"/>
-              <a:t>9/10/18</a:t>
+              <a:t>9/13/18</a:t>
             </a:fld>
             <a:endParaRPr lang="en-US"/>
           </a:p>
@@ -648,7 +648,7 @@
           <a:p>
             <a:fld id="{D3263C19-BABB-6B4C-BCF7-22CEE07C7D3B}" type="datetimeFigureOut">
               <a:rPr lang="en-US" smtClean="0"/>
-              <a:t>9/10/18</a:t>
+              <a:t>9/13/18</a:t>
             </a:fld>
             <a:endParaRPr lang="en-US"/>
           </a:p>
@@ -816,7 +816,7 @@
           <a:p>
             <a:fld id="{D3263C19-BABB-6B4C-BCF7-22CEE07C7D3B}" type="datetimeFigureOut">
               <a:rPr lang="en-US" smtClean="0"/>
-              <a:t>9/10/18</a:t>
+              <a:t>9/13/18</a:t>
             </a:fld>
             <a:endParaRPr lang="en-US"/>
           </a:p>
@@ -1061,7 +1061,7 @@
           <a:p>
             <a:fld id="{D3263C19-BABB-6B4C-BCF7-22CEE07C7D3B}" type="datetimeFigureOut">
               <a:rPr lang="en-US" smtClean="0"/>
-              <a:t>9/10/18</a:t>
+              <a:t>9/13/18</a:t>
             </a:fld>
             <a:endParaRPr lang="en-US"/>
           </a:p>
@@ -1346,7 +1346,7 @@
           <a:p>
             <a:fld id="{D3263C19-BABB-6B4C-BCF7-22CEE07C7D3B}" type="datetimeFigureOut">
               <a:rPr lang="en-US" smtClean="0"/>
-              <a:t>9/10/18</a:t>
+              <a:t>9/13/18</a:t>
             </a:fld>
             <a:endParaRPr lang="en-US"/>
           </a:p>
@@ -1765,7 +1765,7 @@
           <a:p>
             <a:fld id="{D3263C19-BABB-6B4C-BCF7-22CEE07C7D3B}" type="datetimeFigureOut">
               <a:rPr lang="en-US" smtClean="0"/>
-              <a:t>9/10/18</a:t>
+              <a:t>9/13/18</a:t>
             </a:fld>
             <a:endParaRPr lang="en-US"/>
           </a:p>
@@ -1882,7 +1882,7 @@
           <a:p>
             <a:fld id="{D3263C19-BABB-6B4C-BCF7-22CEE07C7D3B}" type="datetimeFigureOut">
               <a:rPr lang="en-US" smtClean="0"/>
-              <a:t>9/10/18</a:t>
+              <a:t>9/13/18</a:t>
             </a:fld>
             <a:endParaRPr lang="en-US"/>
           </a:p>
@@ -1977,7 +1977,7 @@
           <a:p>
             <a:fld id="{D3263C19-BABB-6B4C-BCF7-22CEE07C7D3B}" type="datetimeFigureOut">
               <a:rPr lang="en-US" smtClean="0"/>
-              <a:t>9/10/18</a:t>
+              <a:t>9/13/18</a:t>
             </a:fld>
             <a:endParaRPr lang="en-US"/>
           </a:p>
@@ -2252,7 +2252,7 @@
           <a:p>
             <a:fld id="{D3263C19-BABB-6B4C-BCF7-22CEE07C7D3B}" type="datetimeFigureOut">
               <a:rPr lang="en-US" smtClean="0"/>
-              <a:t>9/10/18</a:t>
+              <a:t>9/13/18</a:t>
             </a:fld>
             <a:endParaRPr lang="en-US"/>
           </a:p>
@@ -2504,7 +2504,7 @@
           <a:p>
             <a:fld id="{D3263C19-BABB-6B4C-BCF7-22CEE07C7D3B}" type="datetimeFigureOut">
               <a:rPr lang="en-US" smtClean="0"/>
-              <a:t>9/10/18</a:t>
+              <a:t>9/13/18</a:t>
             </a:fld>
             <a:endParaRPr lang="en-US"/>
           </a:p>
@@ -2715,7 +2715,7 @@
           <a:p>
             <a:fld id="{D3263C19-BABB-6B4C-BCF7-22CEE07C7D3B}" type="datetimeFigureOut">
               <a:rPr lang="en-US" smtClean="0"/>
-              <a:t>9/10/18</a:t>
+              <a:t>9/13/18</a:t>
             </a:fld>
             <a:endParaRPr lang="en-US"/>
           </a:p>
@@ -3297,21 +3297,7 @@
                 <a:latin typeface="Times"/>
                 <a:cs typeface="Times"/>
               </a:rPr>
-              <a:t>α</a:t>
-            </a:r>
-            <a:r>
-              <a:rPr lang="en-US" sz="2400" i="1" dirty="0">
-                <a:latin typeface="Times"/>
-                <a:cs typeface="Times"/>
-              </a:rPr>
-              <a:t> </a:t>
-            </a:r>
-            <a:r>
-              <a:rPr lang="en-US" sz="2400" dirty="0">
-                <a:latin typeface="Times"/>
-                <a:cs typeface="Times"/>
-              </a:rPr>
-              <a:t> ~ 43°</a:t>
+              <a:t>α ~ 43°</a:t>
             </a:r>
           </a:p>
         </p:txBody>
@@ -3504,7 +3490,7 @@
         </p:nvSpPr>
         <p:spPr>
           <a:xfrm>
-            <a:off x="5459380" y="1514002"/>
+            <a:off x="5458368" y="1514002"/>
             <a:ext cx="1406071" cy="461665"/>
           </a:xfrm>
           <a:prstGeom prst="rect">
@@ -3531,20 +3517,6 @@
                 <a:cs typeface="Times"/>
               </a:rPr>
               <a:t> </a:t>
-            </a:r>
-            <a:r>
-              <a:rPr lang="en-US" sz="2400" dirty="0">
-                <a:latin typeface="Times"/>
-                <a:cs typeface="Times"/>
-              </a:rPr>
-              <a:t> </a:t>
-            </a:r>
-            <a:r>
-              <a:rPr lang="ar-IQ" sz="2400" dirty="0">
-                <a:latin typeface="Times"/>
-                <a:cs typeface="Times"/>
-              </a:rPr>
-              <a:t>‍</a:t>
             </a:r>
             <a:r>
               <a:rPr lang="en-US" sz="2400" dirty="0">
@@ -3763,21 +3735,7 @@
                 <a:latin typeface="Times"/>
                 <a:cs typeface="Times"/>
               </a:rPr>
-              <a:t>α</a:t>
-            </a:r>
-            <a:r>
-              <a:rPr lang="en-US" sz="2400" i="1" dirty="0">
-                <a:latin typeface="Times"/>
-                <a:cs typeface="Times"/>
-              </a:rPr>
-              <a:t> </a:t>
-            </a:r>
-            <a:r>
-              <a:rPr lang="en-US" sz="2400" dirty="0">
-                <a:latin typeface="Times"/>
-                <a:cs typeface="Times"/>
-              </a:rPr>
-              <a:t> ~ 42°</a:t>
+              <a:t>α ~ 42°</a:t>
             </a:r>
           </a:p>
         </p:txBody>
@@ -3834,7 +3792,7 @@
         </p:nvSpPr>
         <p:spPr>
           <a:xfrm>
-            <a:off x="132190" y="1125153"/>
+            <a:off x="86182" y="1125153"/>
             <a:ext cx="1406071" cy="461665"/>
           </a:xfrm>
           <a:prstGeom prst="rect">
@@ -3872,7 +3830,7 @@
         </p:nvSpPr>
         <p:spPr>
           <a:xfrm>
-            <a:off x="5418111" y="-52329"/>
+            <a:off x="5458368" y="-52329"/>
             <a:ext cx="1681824" cy="461665"/>
           </a:xfrm>
           <a:prstGeom prst="rect">

</xml_diff>